<commit_message>
to meet submission due date
</commit_message>
<xml_diff>
--- a/Project Presentation.pptx
+++ b/Project Presentation.pptx
@@ -8,8 +8,10 @@
     <p:sldId id="256" r:id="rId2"/>
     <p:sldId id="257" r:id="rId3"/>
     <p:sldId id="258" r:id="rId4"/>
-    <p:sldId id="260" r:id="rId5"/>
-    <p:sldId id="263" r:id="rId6"/>
+    <p:sldId id="264" r:id="rId5"/>
+    <p:sldId id="265" r:id="rId6"/>
+    <p:sldId id="260" r:id="rId7"/>
+    <p:sldId id="263" r:id="rId8"/>
   </p:sldIdLst>
   <p:sldSz cx="12192000" cy="6858000"/>
   <p:notesSz cx="6858000" cy="9144000"/>
@@ -292,7 +294,7 @@
           <a:p>
             <a:fld id="{76969C88-B244-455D-A017-012B25B1ACDD}" type="datetimeFigureOut">
               <a:rPr lang="en-US" smtClean="0"/>
-              <a:t>11/16/20</a:t>
+              <a:t>11/24/20</a:t>
             </a:fld>
             <a:endParaRPr lang="en-US"/>
           </a:p>
@@ -490,7 +492,7 @@
           <a:p>
             <a:fld id="{76969C88-B244-455D-A017-012B25B1ACDD}" type="datetimeFigureOut">
               <a:rPr lang="en-US" smtClean="0"/>
-              <a:t>11/16/20</a:t>
+              <a:t>11/24/20</a:t>
             </a:fld>
             <a:endParaRPr lang="en-US"/>
           </a:p>
@@ -698,7 +700,7 @@
           <a:p>
             <a:fld id="{76969C88-B244-455D-A017-012B25B1ACDD}" type="datetimeFigureOut">
               <a:rPr lang="en-US" smtClean="0"/>
-              <a:t>11/16/20</a:t>
+              <a:t>11/24/20</a:t>
             </a:fld>
             <a:endParaRPr lang="en-US"/>
           </a:p>
@@ -897,7 +899,7 @@
           <a:p>
             <a:fld id="{76969C88-B244-455D-A017-012B25B1ACDD}" type="datetimeFigureOut">
               <a:rPr lang="en-US" smtClean="0"/>
-              <a:t>11/16/20</a:t>
+              <a:t>11/24/20</a:t>
             </a:fld>
             <a:endParaRPr lang="en-US"/>
           </a:p>
@@ -1172,7 +1174,7 @@
           <a:p>
             <a:fld id="{76969C88-B244-455D-A017-012B25B1ACDD}" type="datetimeFigureOut">
               <a:rPr lang="en-US" smtClean="0"/>
-              <a:t>11/16/20</a:t>
+              <a:t>11/24/20</a:t>
             </a:fld>
             <a:endParaRPr lang="en-US"/>
           </a:p>
@@ -1437,7 +1439,7 @@
           <a:p>
             <a:fld id="{76969C88-B244-455D-A017-012B25B1ACDD}" type="datetimeFigureOut">
               <a:rPr lang="en-US" smtClean="0"/>
-              <a:t>11/16/20</a:t>
+              <a:t>11/24/20</a:t>
             </a:fld>
             <a:endParaRPr lang="en-US"/>
           </a:p>
@@ -1849,7 +1851,7 @@
           <a:p>
             <a:fld id="{76969C88-B244-455D-A017-012B25B1ACDD}" type="datetimeFigureOut">
               <a:rPr lang="en-US" smtClean="0"/>
-              <a:t>11/16/20</a:t>
+              <a:t>11/24/20</a:t>
             </a:fld>
             <a:endParaRPr lang="en-US"/>
           </a:p>
@@ -1990,7 +1992,7 @@
           <a:p>
             <a:fld id="{76969C88-B244-455D-A017-012B25B1ACDD}" type="datetimeFigureOut">
               <a:rPr lang="en-US" smtClean="0"/>
-              <a:t>11/16/20</a:t>
+              <a:t>11/24/20</a:t>
             </a:fld>
             <a:endParaRPr lang="en-US"/>
           </a:p>
@@ -2103,7 +2105,7 @@
           <a:p>
             <a:fld id="{76969C88-B244-455D-A017-012B25B1ACDD}" type="datetimeFigureOut">
               <a:rPr lang="en-US" smtClean="0"/>
-              <a:t>11/16/20</a:t>
+              <a:t>11/24/20</a:t>
             </a:fld>
             <a:endParaRPr lang="en-US"/>
           </a:p>
@@ -2415,7 +2417,7 @@
           <a:p>
             <a:fld id="{76969C88-B244-455D-A017-012B25B1ACDD}" type="datetimeFigureOut">
               <a:rPr lang="en-US" smtClean="0"/>
-              <a:t>11/16/20</a:t>
+              <a:t>11/24/20</a:t>
             </a:fld>
             <a:endParaRPr lang="en-US"/>
           </a:p>
@@ -2706,7 +2708,7 @@
           <a:p>
             <a:fld id="{76969C88-B244-455D-A017-012B25B1ACDD}" type="datetimeFigureOut">
               <a:rPr lang="en-US" smtClean="0"/>
-              <a:t>11/16/20</a:t>
+              <a:t>11/24/20</a:t>
             </a:fld>
             <a:endParaRPr lang="en-US"/>
           </a:p>
@@ -3462,7 +3464,7 @@
             <a:fld id="{76969C88-B244-455D-A017-012B25B1ACDD}" type="datetimeFigureOut">
               <a:rPr lang="en-US" smtClean="0"/>
               <a:pPr/>
-              <a:t>11/16/20</a:t>
+              <a:t>11/24/20</a:t>
             </a:fld>
             <a:endParaRPr lang="en-US"/>
           </a:p>
@@ -4491,10 +4493,9 @@
           <a:lstStyle/>
           <a:p>
             <a:r>
-              <a:rPr lang="en-US" dirty="0"/>
-              <a:t>Problem Statement</a:t>
-            </a:r>
-            <a:endParaRPr lang="en-IN" dirty="0"/>
+              <a:rPr lang="en-IN" dirty="0"/>
+              <a:t>Project: Building A Library</a:t>
+            </a:r>
           </a:p>
         </p:txBody>
       </p:sp>
@@ -4517,9 +4518,18 @@
         <p:spPr/>
         <p:txBody>
           <a:bodyPr>
-            <a:normAutofit/>
+            <a:normAutofit fontScale="47500" lnSpcReduction="20000"/>
           </a:bodyPr>
           <a:lstStyle/>
+          <a:p>
+            <a:pPr marL="0" indent="0">
+              <a:buNone/>
+            </a:pPr>
+            <a:r>
+              <a:rPr lang="en-SG" dirty="0"/>
+              <a:t>Requirement of the project:</a:t>
+            </a:r>
+          </a:p>
           <a:p>
             <a:r>
               <a:rPr lang="en-SG" dirty="0"/>
@@ -4546,6 +4556,99 @@
               <a:rPr lang="en-SG" dirty="0"/>
               <a:t>A user can provide a review of the book or based on his / her experience </a:t>
             </a:r>
+          </a:p>
+          <a:p>
+            <a:r>
+              <a:rPr lang="en-SG" dirty="0"/>
+              <a:t>The web site should contain at least three pages (three views) </a:t>
+            </a:r>
+          </a:p>
+          <a:p>
+            <a:pPr lvl="1"/>
+            <a:r>
+              <a:rPr lang="en-SG" dirty="0"/>
+              <a:t>Home page to display what the website is about </a:t>
+            </a:r>
+          </a:p>
+          <a:p>
+            <a:pPr lvl="1"/>
+            <a:r>
+              <a:rPr lang="en-SG" dirty="0"/>
+              <a:t>List page to display the list of products that are provided on the web site </a:t>
+            </a:r>
+          </a:p>
+          <a:p>
+            <a:pPr lvl="1"/>
+            <a:r>
+              <a:rPr lang="en-SG" dirty="0"/>
+              <a:t>Detail page that details about the different aspects of the product </a:t>
+            </a:r>
+          </a:p>
+          <a:p>
+            <a:r>
+              <a:rPr lang="en-SG" dirty="0"/>
+              <a:t>Each page / view should be clearly divided into ReactJS components </a:t>
+            </a:r>
+          </a:p>
+          <a:p>
+            <a:r>
+              <a:rPr lang="en-SG" dirty="0"/>
+              <a:t>The layout should be designed in bootstrap using in flex box fundamentals </a:t>
+            </a:r>
+          </a:p>
+          <a:p>
+            <a:r>
+              <a:rPr lang="en-SG" dirty="0"/>
+              <a:t>The application should follow a single page application principle </a:t>
+            </a:r>
+          </a:p>
+          <a:p>
+            <a:r>
+              <a:rPr lang="en-SG" dirty="0"/>
+              <a:t>All application should be tested for accessibility </a:t>
+            </a:r>
+          </a:p>
+          <a:p>
+            <a:pPr marL="0" indent="0">
+              <a:buNone/>
+            </a:pPr>
+            <a:endParaRPr lang="en-SG" dirty="0"/>
+          </a:p>
+        </p:txBody>
+      </p:sp>
+      <p:sp>
+        <p:nvSpPr>
+          <p:cNvPr id="5" name="TextBox 4">
+            <a:extLst>
+              <a:ext uri="{FF2B5EF4-FFF2-40B4-BE49-F238E27FC236}">
+                <a16:creationId xmlns:a16="http://schemas.microsoft.com/office/drawing/2014/main" id="{D4A358FD-4350-F94F-98F9-2AF97D147DFA}"/>
+              </a:ext>
+            </a:extLst>
+          </p:cNvPr>
+          <p:cNvSpPr txBox="1"/>
+          <p:nvPr/>
+        </p:nvSpPr>
+        <p:spPr>
+          <a:xfrm>
+            <a:off x="7413172" y="3148280"/>
+            <a:ext cx="3265714" cy="1323439"/>
+          </a:xfrm>
+          <a:prstGeom prst="rect">
+            <a:avLst/>
+          </a:prstGeom>
+          <a:noFill/>
+        </p:spPr>
+        <p:txBody>
+          <a:bodyPr wrap="square" rtlCol="0">
+            <a:spAutoFit/>
+          </a:bodyPr>
+          <a:lstStyle/>
+          <a:p>
+            <a:r>
+              <a:rPr lang="en-US" sz="8000" b="1" dirty="0"/>
+              <a:t>50%</a:t>
+            </a:r>
+            <a:endParaRPr lang="en-US" sz="8000" dirty="0"/>
           </a:p>
         </p:txBody>
       </p:sp>
@@ -4601,10 +4704,9 @@
           <a:lstStyle/>
           <a:p>
             <a:r>
-              <a:rPr lang="en-US" dirty="0"/>
-              <a:t>Solution Approach</a:t>
-            </a:r>
-            <a:endParaRPr lang="en-IN" dirty="0"/>
+              <a:rPr lang="en-IN" dirty="0"/>
+              <a:t>Problem that I encountered:</a:t>
+            </a:r>
           </a:p>
         </p:txBody>
       </p:sp>
@@ -4626,37 +4728,38 @@
         </p:nvSpPr>
         <p:spPr/>
         <p:txBody>
-          <a:bodyPr/>
-          <a:lstStyle/>
-          <a:p>
+          <a:bodyPr>
+            <a:normAutofit lnSpcReduction="10000"/>
+          </a:bodyPr>
+          <a:lstStyle/>
+          <a:p>
+            <a:r>
+              <a:rPr lang="en-IN" dirty="0" err="1"/>
+              <a:t>APi</a:t>
+            </a:r>
             <a:r>
               <a:rPr lang="en-IN" dirty="0"/>
-              <a:t>using React JS, Bootstrap to set up the website</a:t>
-            </a:r>
-          </a:p>
-          <a:p>
+              <a:t> : google book is not a good </a:t>
+            </a:r>
+            <a:r>
+              <a:rPr lang="en-IN" dirty="0" err="1"/>
+              <a:t>api</a:t>
+            </a:r>
             <a:r>
               <a:rPr lang="en-IN" dirty="0"/>
-              <a:t>If possible (within a week),</a:t>
-            </a:r>
-          </a:p>
-          <a:p>
-            <a:pPr>
-              <a:buFontTx/>
-              <a:buChar char="-"/>
-            </a:pPr>
+              <a:t> –&gt; 1000 quota daily to request  -&gt; lead to empty page</a:t>
+            </a:r>
+          </a:p>
+          <a:p>
             <a:r>
               <a:rPr lang="en-IN" dirty="0"/>
-              <a:t>To add the required functions of a library to the project</a:t>
-            </a:r>
-          </a:p>
-          <a:p>
-            <a:pPr marL="0" indent="0">
-              <a:buNone/>
-            </a:pPr>
+              <a:t>Modal : not able to make the modal to display info related to the specific set of books -&gt; trying to figure out how use “super props”/ “this”</a:t>
+            </a:r>
+          </a:p>
+          <a:p>
             <a:r>
               <a:rPr lang="en-IN" dirty="0"/>
-              <a:t>- Change the UI of the website</a:t>
+              <a:t>Heart Animation: the colour won’t change when click -&gt; trying to figure out how to do that.</a:t>
             </a:r>
           </a:p>
         </p:txBody>
@@ -4696,7 +4799,7 @@
           <p:cNvPr id="2" name="Title 1">
             <a:extLst>
               <a:ext uri="{FF2B5EF4-FFF2-40B4-BE49-F238E27FC236}">
-                <a16:creationId xmlns:a16="http://schemas.microsoft.com/office/drawing/2014/main" id="{128D57C2-6CEC-4FE3-83EE-DECDDEFC849F}"/>
+                <a16:creationId xmlns:a16="http://schemas.microsoft.com/office/drawing/2014/main" id="{8C8573FD-81DE-E64B-952D-30A9750BFCE7}"/>
               </a:ext>
             </a:extLst>
           </p:cNvPr>
@@ -4713,60 +4816,57 @@
           <a:lstStyle/>
           <a:p>
             <a:r>
+              <a:rPr lang="en-IN" dirty="0"/>
+              <a:t>Problem that I encountered</a:t>
+            </a:r>
+            <a:endParaRPr lang="en-US" dirty="0"/>
+          </a:p>
+        </p:txBody>
+      </p:sp>
+      <p:sp>
+        <p:nvSpPr>
+          <p:cNvPr id="3" name="Content Placeholder 2">
+            <a:extLst>
+              <a:ext uri="{FF2B5EF4-FFF2-40B4-BE49-F238E27FC236}">
+                <a16:creationId xmlns:a16="http://schemas.microsoft.com/office/drawing/2014/main" id="{54115F58-9FFD-334F-B990-8534DB2D5AB3}"/>
+              </a:ext>
+            </a:extLst>
+          </p:cNvPr>
+          <p:cNvSpPr>
+            <a:spLocks noGrp="1"/>
+          </p:cNvSpPr>
+          <p:nvPr>
+            <p:ph idx="1"/>
+          </p:nvPr>
+        </p:nvSpPr>
+        <p:spPr/>
+        <p:txBody>
+          <a:bodyPr/>
+          <a:lstStyle/>
+          <a:p>
+            <a:r>
               <a:rPr lang="en-US" dirty="0"/>
-              <a:t>Issues Faced</a:t>
-            </a:r>
-            <a:endParaRPr lang="en-IN" dirty="0"/>
-          </a:p>
-        </p:txBody>
-      </p:sp>
-      <p:sp>
-        <p:nvSpPr>
-          <p:cNvPr id="3" name="Content Placeholder 2">
-            <a:extLst>
-              <a:ext uri="{FF2B5EF4-FFF2-40B4-BE49-F238E27FC236}">
-                <a16:creationId xmlns:a16="http://schemas.microsoft.com/office/drawing/2014/main" id="{CB9BD856-C0EF-40DB-A0CA-A4B9565F28D8}"/>
-              </a:ext>
-            </a:extLst>
-          </p:cNvPr>
-          <p:cNvSpPr>
-            <a:spLocks noGrp="1"/>
-          </p:cNvSpPr>
-          <p:nvPr>
-            <p:ph idx="1"/>
-          </p:nvPr>
-        </p:nvSpPr>
-        <p:spPr/>
-        <p:txBody>
-          <a:bodyPr/>
-          <a:lstStyle/>
-          <a:p>
-            <a:r>
-              <a:rPr lang="en-IN" dirty="0"/>
-              <a:t>Installation on React Modal and Animation</a:t>
-            </a:r>
-          </a:p>
-          <a:p>
-            <a:r>
-              <a:rPr lang="en-IN" dirty="0"/>
-              <a:t>Working on React DOM, Event Handling concept</a:t>
-            </a:r>
-          </a:p>
-          <a:p>
-            <a:endParaRPr lang="en-IN" dirty="0"/>
+              <a:t>Navbar item: doesn’t lead to next page -&gt; trying to find out how to make the routing work.</a:t>
+            </a:r>
+          </a:p>
+          <a:p>
+            <a:r>
+              <a:rPr lang="en-US" dirty="0"/>
+              <a:t>Shopping Cart: no able to complete this component. The tutorials online are too complicated and required redux knowledge</a:t>
+            </a:r>
           </a:p>
           <a:p>
             <a:pPr marL="0" indent="0">
               <a:buNone/>
             </a:pPr>
-            <a:endParaRPr lang="en-IN" dirty="0"/>
+            <a:endParaRPr lang="en-US" dirty="0"/>
           </a:p>
         </p:txBody>
       </p:sp>
     </p:spTree>
     <p:extLst>
       <p:ext uri="{BB962C8B-B14F-4D97-AF65-F5344CB8AC3E}">
-        <p14:creationId xmlns:p14="http://schemas.microsoft.com/office/powerpoint/2010/main" val="4019287571"/>
+        <p14:creationId xmlns:p14="http://schemas.microsoft.com/office/powerpoint/2010/main" val="3029131116"/>
       </p:ext>
     </p:extLst>
   </p:cSld>
@@ -4798,6 +4898,244 @@
           <p:cNvPr id="2" name="Title 1">
             <a:extLst>
               <a:ext uri="{FF2B5EF4-FFF2-40B4-BE49-F238E27FC236}">
+                <a16:creationId xmlns:a16="http://schemas.microsoft.com/office/drawing/2014/main" id="{6D4AE292-0732-6042-ABBF-F2E6ADBFE358}"/>
+              </a:ext>
+            </a:extLst>
+          </p:cNvPr>
+          <p:cNvSpPr>
+            <a:spLocks noGrp="1"/>
+          </p:cNvSpPr>
+          <p:nvPr>
+            <p:ph type="title"/>
+          </p:nvPr>
+        </p:nvSpPr>
+        <p:spPr/>
+        <p:txBody>
+          <a:bodyPr/>
+          <a:lstStyle/>
+          <a:p>
+            <a:r>
+              <a:rPr lang="en-US" dirty="0"/>
+              <a:t>My Take Away from the Project:</a:t>
+            </a:r>
+          </a:p>
+        </p:txBody>
+      </p:sp>
+      <p:sp>
+        <p:nvSpPr>
+          <p:cNvPr id="3" name="Content Placeholder 2">
+            <a:extLst>
+              <a:ext uri="{FF2B5EF4-FFF2-40B4-BE49-F238E27FC236}">
+                <a16:creationId xmlns:a16="http://schemas.microsoft.com/office/drawing/2014/main" id="{C741E41F-75D7-FA48-B185-314B189CB757}"/>
+              </a:ext>
+            </a:extLst>
+          </p:cNvPr>
+          <p:cNvSpPr>
+            <a:spLocks noGrp="1"/>
+          </p:cNvSpPr>
+          <p:nvPr>
+            <p:ph idx="1"/>
+          </p:nvPr>
+        </p:nvSpPr>
+        <p:spPr/>
+        <p:txBody>
+          <a:bodyPr/>
+          <a:lstStyle/>
+          <a:p>
+            <a:r>
+              <a:rPr lang="en-US" dirty="0"/>
+              <a:t>The power of bootstrap – ditching CSS</a:t>
+            </a:r>
+          </a:p>
+          <a:p>
+            <a:r>
+              <a:rPr lang="en-US" dirty="0"/>
+              <a:t>Modular concept to keep ReactJS </a:t>
+            </a:r>
+            <a:r>
+              <a:rPr lang="en-US" dirty="0" err="1"/>
+              <a:t>App.js</a:t>
+            </a:r>
+            <a:r>
+              <a:rPr lang="en-US" dirty="0"/>
+              <a:t> page clean and easy to read</a:t>
+            </a:r>
+          </a:p>
+          <a:p>
+            <a:r>
+              <a:rPr lang="en-US" dirty="0"/>
+              <a:t>How to recycle/ reuse the codes </a:t>
+            </a:r>
+          </a:p>
+        </p:txBody>
+      </p:sp>
+    </p:spTree>
+    <p:extLst>
+      <p:ext uri="{BB962C8B-B14F-4D97-AF65-F5344CB8AC3E}">
+        <p14:creationId xmlns:p14="http://schemas.microsoft.com/office/powerpoint/2010/main" val="615400606"/>
+      </p:ext>
+    </p:extLst>
+  </p:cSld>
+  <p:clrMapOvr>
+    <a:masterClrMapping/>
+  </p:clrMapOvr>
+</p:sld>
+</file>
+
+<file path=ppt/slides/slide6.xml><?xml version="1.0" encoding="utf-8"?>
+<p:sld xmlns:a="http://schemas.openxmlformats.org/drawingml/2006/main" xmlns:r="http://schemas.openxmlformats.org/officeDocument/2006/relationships" xmlns:p="http://schemas.openxmlformats.org/presentationml/2006/main">
+  <p:cSld>
+    <p:spTree>
+      <p:nvGrpSpPr>
+        <p:cNvPr id="1" name=""/>
+        <p:cNvGrpSpPr/>
+        <p:nvPr/>
+      </p:nvGrpSpPr>
+      <p:grpSpPr>
+        <a:xfrm>
+          <a:off x="0" y="0"/>
+          <a:ext cx="0" cy="0"/>
+          <a:chOff x="0" y="0"/>
+          <a:chExt cx="0" cy="0"/>
+        </a:xfrm>
+      </p:grpSpPr>
+      <p:sp>
+        <p:nvSpPr>
+          <p:cNvPr id="2" name="Title 1">
+            <a:extLst>
+              <a:ext uri="{FF2B5EF4-FFF2-40B4-BE49-F238E27FC236}">
+                <a16:creationId xmlns:a16="http://schemas.microsoft.com/office/drawing/2014/main" id="{128D57C2-6CEC-4FE3-83EE-DECDDEFC849F}"/>
+              </a:ext>
+            </a:extLst>
+          </p:cNvPr>
+          <p:cNvSpPr>
+            <a:spLocks noGrp="1"/>
+          </p:cNvSpPr>
+          <p:nvPr>
+            <p:ph type="title"/>
+          </p:nvPr>
+        </p:nvSpPr>
+        <p:spPr/>
+        <p:txBody>
+          <a:bodyPr/>
+          <a:lstStyle/>
+          <a:p>
+            <a:r>
+              <a:rPr lang="en-IN" dirty="0"/>
+              <a:t>What I can improve:</a:t>
+            </a:r>
+          </a:p>
+        </p:txBody>
+      </p:sp>
+      <p:sp>
+        <p:nvSpPr>
+          <p:cNvPr id="3" name="Content Placeholder 2">
+            <a:extLst>
+              <a:ext uri="{FF2B5EF4-FFF2-40B4-BE49-F238E27FC236}">
+                <a16:creationId xmlns:a16="http://schemas.microsoft.com/office/drawing/2014/main" id="{CB9BD856-C0EF-40DB-A0CA-A4B9565F28D8}"/>
+              </a:ext>
+            </a:extLst>
+          </p:cNvPr>
+          <p:cNvSpPr>
+            <a:spLocks noGrp="1"/>
+          </p:cNvSpPr>
+          <p:nvPr>
+            <p:ph idx="1"/>
+          </p:nvPr>
+        </p:nvSpPr>
+        <p:spPr/>
+        <p:txBody>
+          <a:bodyPr>
+            <a:normAutofit lnSpcReduction="10000"/>
+          </a:bodyPr>
+          <a:lstStyle/>
+          <a:p>
+            <a:r>
+              <a:rPr lang="en-IN" dirty="0"/>
+              <a:t>Foundation of JS and ReactJS, API call, </a:t>
+            </a:r>
+            <a:r>
+              <a:rPr lang="en-IN" dirty="0" err="1"/>
+              <a:t>Axios</a:t>
+            </a:r>
+            <a:r>
+              <a:rPr lang="en-IN" dirty="0"/>
+              <a:t> and etc</a:t>
+            </a:r>
+          </a:p>
+          <a:p>
+            <a:r>
+              <a:rPr lang="en-IN" dirty="0"/>
+              <a:t>Practise </a:t>
+            </a:r>
+          </a:p>
+          <a:p>
+            <a:r>
+              <a:rPr lang="en-IN" dirty="0"/>
+              <a:t>Code everyday</a:t>
+            </a:r>
+          </a:p>
+          <a:p>
+            <a:r>
+              <a:rPr lang="en-IN" dirty="0"/>
+              <a:t>Learn by cloning established websites (</a:t>
+            </a:r>
+          </a:p>
+          <a:p>
+            <a:r>
+              <a:rPr lang="en-IN" dirty="0"/>
+              <a:t>Create small components </a:t>
+            </a:r>
+          </a:p>
+          <a:p>
+            <a:r>
+              <a:rPr lang="en-IN" dirty="0"/>
+              <a:t>Debugging</a:t>
+            </a:r>
+          </a:p>
+          <a:p>
+            <a:endParaRPr lang="en-IN" dirty="0"/>
+          </a:p>
+          <a:p>
+            <a:endParaRPr lang="en-IN" dirty="0"/>
+          </a:p>
+        </p:txBody>
+      </p:sp>
+    </p:spTree>
+    <p:extLst>
+      <p:ext uri="{BB962C8B-B14F-4D97-AF65-F5344CB8AC3E}">
+        <p14:creationId xmlns:p14="http://schemas.microsoft.com/office/powerpoint/2010/main" val="4019287571"/>
+      </p:ext>
+    </p:extLst>
+  </p:cSld>
+  <p:clrMapOvr>
+    <a:masterClrMapping/>
+  </p:clrMapOvr>
+</p:sld>
+</file>
+
+<file path=ppt/slides/slide7.xml><?xml version="1.0" encoding="utf-8"?>
+<p:sld xmlns:a="http://schemas.openxmlformats.org/drawingml/2006/main" xmlns:r="http://schemas.openxmlformats.org/officeDocument/2006/relationships" xmlns:p="http://schemas.openxmlformats.org/presentationml/2006/main">
+  <p:cSld>
+    <p:spTree>
+      <p:nvGrpSpPr>
+        <p:cNvPr id="1" name=""/>
+        <p:cNvGrpSpPr/>
+        <p:nvPr/>
+      </p:nvGrpSpPr>
+      <p:grpSpPr>
+        <a:xfrm>
+          <a:off x="0" y="0"/>
+          <a:ext cx="0" cy="0"/>
+          <a:chOff x="0" y="0"/>
+          <a:chExt cx="0" cy="0"/>
+        </a:xfrm>
+      </p:grpSpPr>
+      <p:sp>
+        <p:nvSpPr>
+          <p:cNvPr id="2" name="Title 1">
+            <a:extLst>
+              <a:ext uri="{FF2B5EF4-FFF2-40B4-BE49-F238E27FC236}">
                 <a16:creationId xmlns:a16="http://schemas.microsoft.com/office/drawing/2014/main" id="{F6F2C9F3-7EB4-4771-BE28-8EF2FCAE8B90}"/>
               </a:ext>
             </a:extLst>
@@ -4843,7 +5181,7 @@
           <a:bodyPr/>
           <a:lstStyle/>
           <a:p>
-            <a:endParaRPr lang="en-IN"/>
+            <a:endParaRPr lang="en-IN" dirty="0"/>
           </a:p>
         </p:txBody>
       </p:sp>

</xml_diff>